<commit_message>
Implemented Condorcet runner as its own class
</commit_message>
<xml_diff>
--- a/playground/voting-mechanisms/play_data.pptx
+++ b/playground/voting-mechanisms/play_data.pptx
@@ -105,6 +105,11 @@
       </a:defRPr>
     </a:lvl9pPr>
   </p:defaultTextStyle>
+  <p:extLst>
+    <p:ext uri="{EFAFB233-063F-42B5-8137-9DF3F51BA10A}">
+      <p15:sldGuideLst xmlns:p15="http://schemas.microsoft.com/office/powerpoint/2012/main"/>
+    </p:ext>
+  </p:extLst>
 </p:presentation>
 </file>
 
@@ -239,7 +244,7 @@
           <a:p>
             <a:fld id="{BD94D9DB-14C8-4E19-B200-9FFE58F04E4D}" type="datetimeFigureOut">
               <a:rPr lang="de-DE" smtClean="0"/>
-              <a:t>12.09.2020</a:t>
+              <a:t>23.10.2020</a:t>
             </a:fld>
             <a:endParaRPr lang="de-DE"/>
           </a:p>
@@ -409,7 +414,7 @@
           <a:p>
             <a:fld id="{BD94D9DB-14C8-4E19-B200-9FFE58F04E4D}" type="datetimeFigureOut">
               <a:rPr lang="de-DE" smtClean="0"/>
-              <a:t>12.09.2020</a:t>
+              <a:t>23.10.2020</a:t>
             </a:fld>
             <a:endParaRPr lang="de-DE"/>
           </a:p>
@@ -589,7 +594,7 @@
           <a:p>
             <a:fld id="{BD94D9DB-14C8-4E19-B200-9FFE58F04E4D}" type="datetimeFigureOut">
               <a:rPr lang="de-DE" smtClean="0"/>
-              <a:t>12.09.2020</a:t>
+              <a:t>23.10.2020</a:t>
             </a:fld>
             <a:endParaRPr lang="de-DE"/>
           </a:p>
@@ -759,7 +764,7 @@
           <a:p>
             <a:fld id="{BD94D9DB-14C8-4E19-B200-9FFE58F04E4D}" type="datetimeFigureOut">
               <a:rPr lang="de-DE" smtClean="0"/>
-              <a:t>12.09.2020</a:t>
+              <a:t>23.10.2020</a:t>
             </a:fld>
             <a:endParaRPr lang="de-DE"/>
           </a:p>
@@ -1005,7 +1010,7 @@
           <a:p>
             <a:fld id="{BD94D9DB-14C8-4E19-B200-9FFE58F04E4D}" type="datetimeFigureOut">
               <a:rPr lang="de-DE" smtClean="0"/>
-              <a:t>12.09.2020</a:t>
+              <a:t>23.10.2020</a:t>
             </a:fld>
             <a:endParaRPr lang="de-DE"/>
           </a:p>
@@ -1237,7 +1242,7 @@
           <a:p>
             <a:fld id="{BD94D9DB-14C8-4E19-B200-9FFE58F04E4D}" type="datetimeFigureOut">
               <a:rPr lang="de-DE" smtClean="0"/>
-              <a:t>12.09.2020</a:t>
+              <a:t>23.10.2020</a:t>
             </a:fld>
             <a:endParaRPr lang="de-DE"/>
           </a:p>
@@ -1604,7 +1609,7 @@
           <a:p>
             <a:fld id="{BD94D9DB-14C8-4E19-B200-9FFE58F04E4D}" type="datetimeFigureOut">
               <a:rPr lang="de-DE" smtClean="0"/>
-              <a:t>12.09.2020</a:t>
+              <a:t>23.10.2020</a:t>
             </a:fld>
             <a:endParaRPr lang="de-DE"/>
           </a:p>
@@ -1722,7 +1727,7 @@
           <a:p>
             <a:fld id="{BD94D9DB-14C8-4E19-B200-9FFE58F04E4D}" type="datetimeFigureOut">
               <a:rPr lang="de-DE" smtClean="0"/>
-              <a:t>12.09.2020</a:t>
+              <a:t>23.10.2020</a:t>
             </a:fld>
             <a:endParaRPr lang="de-DE"/>
           </a:p>
@@ -1817,7 +1822,7 @@
           <a:p>
             <a:fld id="{BD94D9DB-14C8-4E19-B200-9FFE58F04E4D}" type="datetimeFigureOut">
               <a:rPr lang="de-DE" smtClean="0"/>
-              <a:t>12.09.2020</a:t>
+              <a:t>23.10.2020</a:t>
             </a:fld>
             <a:endParaRPr lang="de-DE"/>
           </a:p>
@@ -2094,7 +2099,7 @@
           <a:p>
             <a:fld id="{BD94D9DB-14C8-4E19-B200-9FFE58F04E4D}" type="datetimeFigureOut">
               <a:rPr lang="de-DE" smtClean="0"/>
-              <a:t>12.09.2020</a:t>
+              <a:t>23.10.2020</a:t>
             </a:fld>
             <a:endParaRPr lang="de-DE"/>
           </a:p>
@@ -2347,7 +2352,7 @@
           <a:p>
             <a:fld id="{BD94D9DB-14C8-4E19-B200-9FFE58F04E4D}" type="datetimeFigureOut">
               <a:rPr lang="de-DE" smtClean="0"/>
-              <a:t>12.09.2020</a:t>
+              <a:t>23.10.2020</a:t>
             </a:fld>
             <a:endParaRPr lang="de-DE"/>
           </a:p>
@@ -2560,7 +2565,7 @@
           <a:p>
             <a:fld id="{BD94D9DB-14C8-4E19-B200-9FFE58F04E4D}" type="datetimeFigureOut">
               <a:rPr lang="de-DE" smtClean="0"/>
-              <a:t>12.09.2020</a:t>
+              <a:t>23.10.2020</a:t>
             </a:fld>
             <a:endParaRPr lang="de-DE"/>
           </a:p>
@@ -3013,6 +3018,13 @@
   <p:clrMapOvr>
     <a:masterClrMapping/>
   </p:clrMapOvr>
+  <p:timing>
+    <p:tnLst>
+      <p:par>
+        <p:cTn id="1" dur="indefinite" restart="never" nodeType="tmRoot"/>
+      </p:par>
+    </p:tnLst>
+  </p:timing>
 </p:sld>
 </file>
 
@@ -3062,14 +3074,14 @@
             <p:ph idx="1"/>
             <p:extLst>
               <p:ext uri="{D42A27DB-BD31-4B8C-83A1-F6EECF244321}">
-                <p14:modId xmlns:p14="http://schemas.microsoft.com/office/powerpoint/2010/main" val="505856619"/>
+                <p14:modId xmlns:p14="http://schemas.microsoft.com/office/powerpoint/2010/main" val="2943849263"/>
               </p:ext>
             </p:extLst>
           </p:nvPr>
         </p:nvGraphicFramePr>
         <p:xfrm>
           <a:off x="838200" y="1834861"/>
-          <a:ext cx="8412480" cy="1854200"/>
+          <a:ext cx="5036128" cy="2007465"/>
         </p:xfrm>
         <a:graphic>
           <a:graphicData uri="http://schemas.openxmlformats.org/drawingml/2006/table">
@@ -3078,28 +3090,28 @@
                 <a:tableStyleId>{5C22544A-7EE6-4342-B048-85BDC9FD1C3A}</a:tableStyleId>
               </a:tblPr>
               <a:tblGrid>
-                <a:gridCol w="2103120">
+                <a:gridCol w="1259032">
                   <a:extLst>
                     <a:ext uri="{9D8B030D-6E8A-4147-A177-3AD203B41FA5}">
                       <a16:colId xmlns:a16="http://schemas.microsoft.com/office/drawing/2014/main" val="3144362514"/>
                     </a:ext>
                   </a:extLst>
                 </a:gridCol>
-                <a:gridCol w="2103120">
+                <a:gridCol w="1259032">
                   <a:extLst>
                     <a:ext uri="{9D8B030D-6E8A-4147-A177-3AD203B41FA5}">
                       <a16:colId xmlns:a16="http://schemas.microsoft.com/office/drawing/2014/main" val="253689244"/>
                     </a:ext>
                   </a:extLst>
                 </a:gridCol>
-                <a:gridCol w="2103120">
+                <a:gridCol w="1259032">
                   <a:extLst>
                     <a:ext uri="{9D8B030D-6E8A-4147-A177-3AD203B41FA5}">
                       <a16:colId xmlns:a16="http://schemas.microsoft.com/office/drawing/2014/main" val="3998084255"/>
                     </a:ext>
                   </a:extLst>
                 </a:gridCol>
-                <a:gridCol w="2103120">
+                <a:gridCol w="1259032">
                   <a:extLst>
                     <a:ext uri="{9D8B030D-6E8A-4147-A177-3AD203B41FA5}">
                       <a16:colId xmlns:a16="http://schemas.microsoft.com/office/drawing/2014/main" val="3903702681"/>
@@ -3107,7 +3119,7 @@
                   </a:extLst>
                 </a:gridCol>
               </a:tblGrid>
-              <a:tr h="370840">
+              <a:tr h="401493">
                 <a:tc>
                   <a:txBody>
                     <a:bodyPr/>
@@ -3174,7 +3186,7 @@
                   </a:ext>
                 </a:extLst>
               </a:tr>
-              <a:tr h="370840">
+              <a:tr h="401493">
                 <a:tc>
                   <a:txBody>
                     <a:bodyPr/>
@@ -3241,7 +3253,7 @@
                   </a:ext>
                 </a:extLst>
               </a:tr>
-              <a:tr h="370840">
+              <a:tr h="401493">
                 <a:tc>
                   <a:txBody>
                     <a:bodyPr/>
@@ -3308,7 +3320,7 @@
                   </a:ext>
                 </a:extLst>
               </a:tr>
-              <a:tr h="370840">
+              <a:tr h="401493">
                 <a:tc>
                   <a:txBody>
                     <a:bodyPr/>
@@ -3375,7 +3387,7 @@
                   </a:ext>
                 </a:extLst>
               </a:tr>
-              <a:tr h="370840">
+              <a:tr h="401493">
                 <a:tc>
                   <a:txBody>
                     <a:bodyPr/>
@@ -3455,7 +3467,7 @@
           <p:nvPr>
             <p:extLst>
               <p:ext uri="{D42A27DB-BD31-4B8C-83A1-F6EECF244321}">
-                <p14:modId xmlns:p14="http://schemas.microsoft.com/office/powerpoint/2010/main" val="781900032"/>
+                <p14:modId xmlns:p14="http://schemas.microsoft.com/office/powerpoint/2010/main" val="2329720702"/>
               </p:ext>
             </p:extLst>
           </p:nvPr>
@@ -3825,7 +3837,7 @@
                     <a:p>
                       <a:pPr algn="ctr"/>
                       <a:r>
-                        <a:rPr lang="de-DE" smtClean="0"/>
+                        <a:rPr lang="de-DE" dirty="0" smtClean="0"/>
                         <a:t>1 : 3</a:t>
                       </a:r>
                       <a:endParaRPr lang="de-DE" dirty="0"/>
@@ -3847,74 +3859,74 @@
                     <a:p>
                       <a:pPr algn="ctr"/>
                       <a:r>
-                        <a:rPr lang="de-DE" dirty="0" smtClean="0"/>
+                        <a:rPr lang="de-DE" b="1" dirty="0" smtClean="0"/>
                         <a:t>4</a:t>
                       </a:r>
-                      <a:endParaRPr lang="de-DE" dirty="0"/>
-                    </a:p>
-                  </a:txBody>
-                  <a:tcPr/>
-                </a:tc>
-                <a:tc>
-                  <a:txBody>
-                    <a:bodyPr/>
-                    <a:lstStyle/>
-                    <a:p>
-                      <a:pPr algn="ctr"/>
-                      <a:r>
-                        <a:rPr lang="de-DE" dirty="0" smtClean="0"/>
+                      <a:endParaRPr lang="de-DE" b="1" dirty="0"/>
+                    </a:p>
+                  </a:txBody>
+                  <a:tcPr/>
+                </a:tc>
+                <a:tc>
+                  <a:txBody>
+                    <a:bodyPr/>
+                    <a:lstStyle/>
+                    <a:p>
+                      <a:pPr algn="ctr"/>
+                      <a:r>
+                        <a:rPr lang="de-DE" b="1" dirty="0" smtClean="0"/>
                         <a:t>3 : 1</a:t>
                       </a:r>
-                      <a:endParaRPr lang="de-DE" dirty="0"/>
-                    </a:p>
-                  </a:txBody>
-                  <a:tcPr/>
-                </a:tc>
-                <a:tc>
-                  <a:txBody>
-                    <a:bodyPr/>
-                    <a:lstStyle/>
-                    <a:p>
-                      <a:pPr algn="ctr"/>
-                      <a:r>
-                        <a:rPr lang="de-DE" dirty="0" smtClean="0"/>
+                      <a:endParaRPr lang="de-DE" b="1" dirty="0"/>
+                    </a:p>
+                  </a:txBody>
+                  <a:tcPr/>
+                </a:tc>
+                <a:tc>
+                  <a:txBody>
+                    <a:bodyPr/>
+                    <a:lstStyle/>
+                    <a:p>
+                      <a:pPr algn="ctr"/>
+                      <a:r>
+                        <a:rPr lang="de-DE" b="1" dirty="0" smtClean="0"/>
                         <a:t>3</a:t>
                       </a:r>
                       <a:r>
-                        <a:rPr lang="de-DE" baseline="0" dirty="0" smtClean="0"/>
+                        <a:rPr lang="de-DE" b="1" baseline="0" dirty="0" smtClean="0"/>
                         <a:t> : 1</a:t>
                       </a:r>
-                      <a:endParaRPr lang="de-DE" dirty="0"/>
-                    </a:p>
-                  </a:txBody>
-                  <a:tcPr/>
-                </a:tc>
-                <a:tc>
-                  <a:txBody>
-                    <a:bodyPr/>
-                    <a:lstStyle/>
-                    <a:p>
-                      <a:pPr algn="ctr"/>
-                      <a:r>
-                        <a:rPr lang="de-DE" dirty="0" smtClean="0"/>
+                      <a:endParaRPr lang="de-DE" b="1" dirty="0"/>
+                    </a:p>
+                  </a:txBody>
+                  <a:tcPr/>
+                </a:tc>
+                <a:tc>
+                  <a:txBody>
+                    <a:bodyPr/>
+                    <a:lstStyle/>
+                    <a:p>
+                      <a:pPr algn="ctr"/>
+                      <a:r>
+                        <a:rPr lang="de-DE" b="1" dirty="0" smtClean="0"/>
                         <a:t>3 : 1</a:t>
                       </a:r>
-                      <a:endParaRPr lang="de-DE" dirty="0"/>
-                    </a:p>
-                  </a:txBody>
-                  <a:tcPr/>
-                </a:tc>
-                <a:tc>
-                  <a:txBody>
-                    <a:bodyPr/>
-                    <a:lstStyle/>
-                    <a:p>
-                      <a:pPr algn="ctr"/>
-                      <a:r>
-                        <a:rPr lang="de-DE" dirty="0" smtClean="0"/>
+                      <a:endParaRPr lang="de-DE" b="1" dirty="0"/>
+                    </a:p>
+                  </a:txBody>
+                  <a:tcPr/>
+                </a:tc>
+                <a:tc>
+                  <a:txBody>
+                    <a:bodyPr/>
+                    <a:lstStyle/>
+                    <a:p>
+                      <a:pPr algn="ctr"/>
+                      <a:r>
+                        <a:rPr lang="de-DE" b="1" dirty="0" smtClean="0"/>
                         <a:t>-</a:t>
                       </a:r>
-                      <a:endParaRPr lang="de-DE" dirty="0"/>
+                      <a:endParaRPr lang="de-DE" b="1" dirty="0"/>
                     </a:p>
                   </a:txBody>
                   <a:tcPr/>
@@ -3939,6 +3951,13 @@
   <p:clrMapOvr>
     <a:masterClrMapping/>
   </p:clrMapOvr>
+  <p:timing>
+    <p:tnLst>
+      <p:par>
+        <p:cTn id="1" dur="indefinite" restart="never" nodeType="tmRoot"/>
+      </p:par>
+    </p:tnLst>
+  </p:timing>
 </p:sld>
 </file>
 

</xml_diff>